<commit_message>
adding to the PowerPoint
</commit_message>
<xml_diff>
--- a/Radiation and Atmosphere Interaction/Report 2/ΕργασίαΔύο.pptx
+++ b/Radiation and Atmosphere Interaction/Report 2/ΕργασίαΔύο.pptx
@@ -11,6 +11,12 @@
     <p:sldId id="258" r:id="rId5"/>
     <p:sldId id="257" r:id="rId6"/>
     <p:sldId id="263" r:id="rId7"/>
+    <p:sldId id="272" r:id="rId8"/>
+    <p:sldId id="268" r:id="rId9"/>
+    <p:sldId id="269" r:id="rId10"/>
+    <p:sldId id="270" r:id="rId11"/>
+    <p:sldId id="271" r:id="rId12"/>
+    <p:sldId id="267" r:id="rId13"/>
   </p:sldIdLst>
   <p:sldSz cx="12192000" cy="6858000"/>
   <p:notesSz cx="6858000" cy="9144000"/>
@@ -265,7 +271,7 @@
           <a:p>
             <a:fld id="{073D55F9-11A3-4523-8F38-6BA37933791A}" type="datetime1">
               <a:rPr lang="en-US" smtClean="0"/>
-              <a:t>12/10/2024</a:t>
+              <a:t>12/17/2024</a:t>
             </a:fld>
             <a:endParaRPr lang="en-US"/>
           </a:p>
@@ -467,7 +473,7 @@
           <a:p>
             <a:fld id="{0B4E757A-3EC2-4683-9080-1A460C37C843}" type="datetime1">
               <a:rPr lang="en-US" smtClean="0"/>
-              <a:t>12/10/2024</a:t>
+              <a:t>12/17/2024</a:t>
             </a:fld>
             <a:endParaRPr lang="en-US"/>
           </a:p>
@@ -683,7 +689,7 @@
           <a:p>
             <a:fld id="{5CC8096C-64ED-4153-A483-5C02E44AD5C3}" type="datetime1">
               <a:rPr lang="en-US" smtClean="0"/>
-              <a:t>12/10/2024</a:t>
+              <a:t>12/17/2024</a:t>
             </a:fld>
             <a:endParaRPr lang="en-US" dirty="0"/>
           </a:p>
@@ -916,7 +922,7 @@
           <a:p>
             <a:fld id="{1CB9D56B-6EBE-4E5F-99D9-2A3DBDF37D0A}" type="datetime1">
               <a:rPr lang="en-US" smtClean="0"/>
-              <a:t>12/10/2024</a:t>
+              <a:t>12/17/2024</a:t>
             </a:fld>
             <a:endParaRPr lang="en-US"/>
           </a:p>
@@ -1193,7 +1199,7 @@
           <a:p>
             <a:fld id="{8C33F3CA-C7E3-432D-9282-18F13836509A}" type="datetime1">
               <a:rPr lang="en-US" smtClean="0"/>
-              <a:t>12/10/2024</a:t>
+              <a:t>12/17/2024</a:t>
             </a:fld>
             <a:endParaRPr lang="en-US" dirty="0"/>
           </a:p>
@@ -1463,7 +1469,7 @@
           <a:p>
             <a:fld id="{75BE9C62-1337-40B8-BA50-E9F4861DB4BC}" type="datetime1">
               <a:rPr lang="en-US" smtClean="0"/>
-              <a:t>12/10/2024</a:t>
+              <a:t>12/17/2024</a:t>
             </a:fld>
             <a:endParaRPr lang="en-US"/>
           </a:p>
@@ -1880,7 +1886,7 @@
           <a:p>
             <a:fld id="{47C195EB-2DA3-4B24-8725-19BC22A7BE50}" type="datetime1">
               <a:rPr lang="en-US" smtClean="0"/>
-              <a:t>12/10/2024</a:t>
+              <a:t>12/17/2024</a:t>
             </a:fld>
             <a:endParaRPr lang="en-US"/>
           </a:p>
@@ -2025,7 +2031,7 @@
           <a:p>
             <a:fld id="{F4E237E6-0076-4915-A5A8-B7C11FA4F374}" type="datetime1">
               <a:rPr lang="en-US" smtClean="0"/>
-              <a:t>12/10/2024</a:t>
+              <a:t>12/17/2024</a:t>
             </a:fld>
             <a:endParaRPr lang="en-US"/>
           </a:p>
@@ -2141,7 +2147,7 @@
           <a:p>
             <a:fld id="{3505F58F-C0B5-422A-8E5A-6B99E5D80F0A}" type="datetime1">
               <a:rPr lang="en-US" smtClean="0"/>
-              <a:t>12/10/2024</a:t>
+              <a:t>12/17/2024</a:t>
             </a:fld>
             <a:endParaRPr lang="en-US"/>
           </a:p>
@@ -2457,7 +2463,7 @@
           <a:p>
             <a:fld id="{7565E655-9687-48DF-A33F-F8824CCCB5D1}" type="datetime1">
               <a:rPr lang="en-US" smtClean="0"/>
-              <a:t>12/10/2024</a:t>
+              <a:t>12/17/2024</a:t>
             </a:fld>
             <a:endParaRPr lang="en-US"/>
           </a:p>
@@ -2753,7 +2759,7 @@
           <a:p>
             <a:fld id="{B97FD56A-AAB8-4544-A495-D0645413C9E3}" type="datetime1">
               <a:rPr lang="en-US" smtClean="0"/>
-              <a:t>12/10/2024</a:t>
+              <a:t>12/17/2024</a:t>
             </a:fld>
             <a:endParaRPr lang="en-US"/>
           </a:p>
@@ -4574,7 +4580,7 @@
             <a:fld id="{193BAB95-8DA7-460B-B00A-7037C8394FB0}" type="datetime1">
               <a:rPr lang="en-US" smtClean="0"/>
               <a:pPr/>
-              <a:t>12/10/2024</a:t>
+              <a:t>12/17/2024</a:t>
             </a:fld>
             <a:endParaRPr lang="en-US" dirty="0"/>
           </a:p>
@@ -7221,6 +7227,432 @@
 </p:sld>
 </file>
 
+<file path=ppt/slides/slide10.xml><?xml version="1.0" encoding="utf-8"?>
+<p:sld xmlns:a="http://schemas.openxmlformats.org/drawingml/2006/main" xmlns:r="http://schemas.openxmlformats.org/officeDocument/2006/relationships" xmlns:p="http://schemas.openxmlformats.org/presentationml/2006/main">
+  <p:cSld>
+    <p:spTree>
+      <p:nvGrpSpPr>
+        <p:cNvPr id="1" name=""/>
+        <p:cNvGrpSpPr/>
+        <p:nvPr/>
+      </p:nvGrpSpPr>
+      <p:grpSpPr>
+        <a:xfrm>
+          <a:off x="0" y="0"/>
+          <a:ext cx="0" cy="0"/>
+          <a:chOff x="0" y="0"/>
+          <a:chExt cx="0" cy="0"/>
+        </a:xfrm>
+      </p:grpSpPr>
+      <p:pic>
+        <p:nvPicPr>
+          <p:cNvPr id="3" name="Picture 2" descr="A graph of different streams&#10;&#10;Description automatically generated with medium confidence">
+            <a:extLst>
+              <a:ext uri="{FF2B5EF4-FFF2-40B4-BE49-F238E27FC236}">
+                <a16:creationId xmlns:a16="http://schemas.microsoft.com/office/drawing/2014/main" id="{599B2EA1-B093-082D-06DD-24C73696A42D}"/>
+              </a:ext>
+            </a:extLst>
+          </p:cNvPr>
+          <p:cNvPicPr>
+            <a:picLocks noChangeAspect="1"/>
+          </p:cNvPicPr>
+          <p:nvPr/>
+        </p:nvPicPr>
+        <p:blipFill>
+          <a:blip r:embed="rId2">
+            <a:extLst>
+              <a:ext uri="{28A0092B-C50C-407E-A947-70E740481C1C}">
+                <a14:useLocalDpi xmlns:a14="http://schemas.microsoft.com/office/drawing/2010/main" val="0"/>
+              </a:ext>
+            </a:extLst>
+          </a:blip>
+          <a:stretch>
+            <a:fillRect/>
+          </a:stretch>
+        </p:blipFill>
+        <p:spPr>
+          <a:xfrm>
+            <a:off x="6246000" y="3407229"/>
+            <a:ext cx="4559808" cy="3419856"/>
+          </a:xfrm>
+          <a:prstGeom prst="rect">
+            <a:avLst/>
+          </a:prstGeom>
+        </p:spPr>
+      </p:pic>
+      <p:pic>
+        <p:nvPicPr>
+          <p:cNvPr id="5" name="Picture 4" descr="A graph of different colors and numbers&#10;&#10;Description automatically generated with medium confidence">
+            <a:extLst>
+              <a:ext uri="{FF2B5EF4-FFF2-40B4-BE49-F238E27FC236}">
+                <a16:creationId xmlns:a16="http://schemas.microsoft.com/office/drawing/2014/main" id="{7E5490BC-107E-01EF-C907-3599368BE01A}"/>
+              </a:ext>
+            </a:extLst>
+          </p:cNvPr>
+          <p:cNvPicPr>
+            <a:picLocks noChangeAspect="1"/>
+          </p:cNvPicPr>
+          <p:nvPr/>
+        </p:nvPicPr>
+        <p:blipFill>
+          <a:blip r:embed="rId3">
+            <a:extLst>
+              <a:ext uri="{28A0092B-C50C-407E-A947-70E740481C1C}">
+                <a14:useLocalDpi xmlns:a14="http://schemas.microsoft.com/office/drawing/2010/main" val="0"/>
+              </a:ext>
+            </a:extLst>
+          </a:blip>
+          <a:stretch>
+            <a:fillRect/>
+          </a:stretch>
+        </p:blipFill>
+        <p:spPr>
+          <a:xfrm>
+            <a:off x="1686192" y="3407229"/>
+            <a:ext cx="4559808" cy="3419856"/>
+          </a:xfrm>
+          <a:prstGeom prst="rect">
+            <a:avLst/>
+          </a:prstGeom>
+        </p:spPr>
+      </p:pic>
+      <p:pic>
+        <p:nvPicPr>
+          <p:cNvPr id="7" name="Picture 6" descr="A graph of different colors and numbers&#10;&#10;Description automatically generated">
+            <a:extLst>
+              <a:ext uri="{FF2B5EF4-FFF2-40B4-BE49-F238E27FC236}">
+                <a16:creationId xmlns:a16="http://schemas.microsoft.com/office/drawing/2014/main" id="{A736AE0C-2544-8B41-A2A2-E8D9471C67A8}"/>
+              </a:ext>
+            </a:extLst>
+          </p:cNvPr>
+          <p:cNvPicPr>
+            <a:picLocks noChangeAspect="1"/>
+          </p:cNvPicPr>
+          <p:nvPr/>
+        </p:nvPicPr>
+        <p:blipFill>
+          <a:blip r:embed="rId4">
+            <a:extLst>
+              <a:ext uri="{28A0092B-C50C-407E-A947-70E740481C1C}">
+                <a14:useLocalDpi xmlns:a14="http://schemas.microsoft.com/office/drawing/2010/main" val="0"/>
+              </a:ext>
+            </a:extLst>
+          </a:blip>
+          <a:stretch>
+            <a:fillRect/>
+          </a:stretch>
+        </p:blipFill>
+        <p:spPr>
+          <a:xfrm>
+            <a:off x="6246000" y="30914"/>
+            <a:ext cx="4559808" cy="3419856"/>
+          </a:xfrm>
+          <a:prstGeom prst="rect">
+            <a:avLst/>
+          </a:prstGeom>
+        </p:spPr>
+      </p:pic>
+      <p:pic>
+        <p:nvPicPr>
+          <p:cNvPr id="9" name="Picture 8" descr="A graph of different colors and numbers&#10;&#10;Description automatically generated with medium confidence">
+            <a:extLst>
+              <a:ext uri="{FF2B5EF4-FFF2-40B4-BE49-F238E27FC236}">
+                <a16:creationId xmlns:a16="http://schemas.microsoft.com/office/drawing/2014/main" id="{969C8BBD-B6EB-28F9-A71F-F0E1EDB13455}"/>
+              </a:ext>
+            </a:extLst>
+          </p:cNvPr>
+          <p:cNvPicPr>
+            <a:picLocks noChangeAspect="1"/>
+          </p:cNvPicPr>
+          <p:nvPr/>
+        </p:nvPicPr>
+        <p:blipFill>
+          <a:blip r:embed="rId5">
+            <a:extLst>
+              <a:ext uri="{28A0092B-C50C-407E-A947-70E740481C1C}">
+                <a14:useLocalDpi xmlns:a14="http://schemas.microsoft.com/office/drawing/2010/main" val="0"/>
+              </a:ext>
+            </a:extLst>
+          </a:blip>
+          <a:stretch>
+            <a:fillRect/>
+          </a:stretch>
+        </p:blipFill>
+        <p:spPr>
+          <a:xfrm>
+            <a:off x="1686192" y="30914"/>
+            <a:ext cx="4559808" cy="3419856"/>
+          </a:xfrm>
+          <a:prstGeom prst="rect">
+            <a:avLst/>
+          </a:prstGeom>
+        </p:spPr>
+      </p:pic>
+      <p:sp>
+        <p:nvSpPr>
+          <p:cNvPr id="10" name="TextBox 9">
+            <a:extLst>
+              <a:ext uri="{FF2B5EF4-FFF2-40B4-BE49-F238E27FC236}">
+                <a16:creationId xmlns:a16="http://schemas.microsoft.com/office/drawing/2014/main" id="{802EF4DA-4B02-B143-2941-E5B3D400B355}"/>
+              </a:ext>
+            </a:extLst>
+          </p:cNvPr>
+          <p:cNvSpPr txBox="1"/>
+          <p:nvPr/>
+        </p:nvSpPr>
+        <p:spPr>
+          <a:xfrm rot="16200000">
+            <a:off x="-253091" y="3266104"/>
+            <a:ext cx="2258786" cy="369332"/>
+          </a:xfrm>
+          <a:prstGeom prst="rect">
+            <a:avLst/>
+          </a:prstGeom>
+          <a:noFill/>
+        </p:spPr>
+        <p:txBody>
+          <a:bodyPr wrap="square" rtlCol="0">
+            <a:spAutoFit/>
+          </a:bodyPr>
+          <a:lstStyle/>
+          <a:p>
+            <a:r>
+              <a:rPr lang="el-GR" dirty="0"/>
+              <a:t>Διάχυτη ακτινοβολία</a:t>
+            </a:r>
+            <a:endParaRPr lang="en-US" dirty="0"/>
+          </a:p>
+        </p:txBody>
+      </p:sp>
+    </p:spTree>
+    <p:extLst>
+      <p:ext uri="{BB962C8B-B14F-4D97-AF65-F5344CB8AC3E}">
+        <p14:creationId xmlns:p14="http://schemas.microsoft.com/office/powerpoint/2010/main" val="2813685280"/>
+      </p:ext>
+    </p:extLst>
+  </p:cSld>
+  <p:clrMapOvr>
+    <a:masterClrMapping/>
+  </p:clrMapOvr>
+</p:sld>
+</file>
+
+<file path=ppt/slides/slide11.xml><?xml version="1.0" encoding="utf-8"?>
+<p:sld xmlns:a="http://schemas.openxmlformats.org/drawingml/2006/main" xmlns:r="http://schemas.openxmlformats.org/officeDocument/2006/relationships" xmlns:p="http://schemas.openxmlformats.org/presentationml/2006/main">
+  <p:cSld>
+    <p:spTree>
+      <p:nvGrpSpPr>
+        <p:cNvPr id="1" name=""/>
+        <p:cNvGrpSpPr/>
+        <p:nvPr/>
+      </p:nvGrpSpPr>
+      <p:grpSpPr>
+        <a:xfrm>
+          <a:off x="0" y="0"/>
+          <a:ext cx="0" cy="0"/>
+          <a:chOff x="0" y="0"/>
+          <a:chExt cx="0" cy="0"/>
+        </a:xfrm>
+      </p:grpSpPr>
+      <p:pic>
+        <p:nvPicPr>
+          <p:cNvPr id="3" name="Picture 2" descr="A graph of different colors and numbers&#10;&#10;Description automatically generated with medium confidence">
+            <a:extLst>
+              <a:ext uri="{FF2B5EF4-FFF2-40B4-BE49-F238E27FC236}">
+                <a16:creationId xmlns:a16="http://schemas.microsoft.com/office/drawing/2014/main" id="{C5468445-8FCA-EBA1-9432-9A431BB19D16}"/>
+              </a:ext>
+            </a:extLst>
+          </p:cNvPr>
+          <p:cNvPicPr>
+            <a:picLocks noChangeAspect="1"/>
+          </p:cNvPicPr>
+          <p:nvPr/>
+        </p:nvPicPr>
+        <p:blipFill>
+          <a:blip r:embed="rId2">
+            <a:extLst>
+              <a:ext uri="{28A0092B-C50C-407E-A947-70E740481C1C}">
+                <a14:useLocalDpi xmlns:a14="http://schemas.microsoft.com/office/drawing/2010/main" val="0"/>
+              </a:ext>
+            </a:extLst>
+          </a:blip>
+          <a:stretch>
+            <a:fillRect/>
+          </a:stretch>
+        </p:blipFill>
+        <p:spPr>
+          <a:xfrm>
+            <a:off x="1099229" y="3438144"/>
+            <a:ext cx="4559808" cy="3419856"/>
+          </a:xfrm>
+          <a:prstGeom prst="rect">
+            <a:avLst/>
+          </a:prstGeom>
+        </p:spPr>
+      </p:pic>
+      <p:pic>
+        <p:nvPicPr>
+          <p:cNvPr id="5" name="Picture 4" descr="A graph of different streams&#10;&#10;Description automatically generated with medium confidence">
+            <a:extLst>
+              <a:ext uri="{FF2B5EF4-FFF2-40B4-BE49-F238E27FC236}">
+                <a16:creationId xmlns:a16="http://schemas.microsoft.com/office/drawing/2014/main" id="{B93E4A1D-7A21-7C78-A275-B4E2615AA4EA}"/>
+              </a:ext>
+            </a:extLst>
+          </p:cNvPr>
+          <p:cNvPicPr>
+            <a:picLocks noChangeAspect="1"/>
+          </p:cNvPicPr>
+          <p:nvPr/>
+        </p:nvPicPr>
+        <p:blipFill>
+          <a:blip r:embed="rId3">
+            <a:extLst>
+              <a:ext uri="{28A0092B-C50C-407E-A947-70E740481C1C}">
+                <a14:useLocalDpi xmlns:a14="http://schemas.microsoft.com/office/drawing/2010/main" val="0"/>
+              </a:ext>
+            </a:extLst>
+          </a:blip>
+          <a:stretch>
+            <a:fillRect/>
+          </a:stretch>
+        </p:blipFill>
+        <p:spPr>
+          <a:xfrm>
+            <a:off x="1099229" y="9143"/>
+            <a:ext cx="4559808" cy="3419856"/>
+          </a:xfrm>
+          <a:prstGeom prst="rect">
+            <a:avLst/>
+          </a:prstGeom>
+        </p:spPr>
+      </p:pic>
+    </p:spTree>
+    <p:extLst>
+      <p:ext uri="{BB962C8B-B14F-4D97-AF65-F5344CB8AC3E}">
+        <p14:creationId xmlns:p14="http://schemas.microsoft.com/office/powerpoint/2010/main" val="3997067659"/>
+      </p:ext>
+    </p:extLst>
+  </p:cSld>
+  <p:clrMapOvr>
+    <a:masterClrMapping/>
+  </p:clrMapOvr>
+</p:sld>
+</file>
+
+<file path=ppt/slides/slide12.xml><?xml version="1.0" encoding="utf-8"?>
+<p:sld xmlns:a="http://schemas.openxmlformats.org/drawingml/2006/main" xmlns:r="http://schemas.openxmlformats.org/officeDocument/2006/relationships" xmlns:p="http://schemas.openxmlformats.org/presentationml/2006/main">
+  <p:cSld>
+    <p:spTree>
+      <p:nvGrpSpPr>
+        <p:cNvPr id="1" name=""/>
+        <p:cNvGrpSpPr/>
+        <p:nvPr/>
+      </p:nvGrpSpPr>
+      <p:grpSpPr>
+        <a:xfrm>
+          <a:off x="0" y="0"/>
+          <a:ext cx="0" cy="0"/>
+          <a:chOff x="0" y="0"/>
+          <a:chExt cx="0" cy="0"/>
+        </a:xfrm>
+      </p:grpSpPr>
+      <p:sp>
+        <p:nvSpPr>
+          <p:cNvPr id="3" name="TextBox 2">
+            <a:extLst>
+              <a:ext uri="{FF2B5EF4-FFF2-40B4-BE49-F238E27FC236}">
+                <a16:creationId xmlns:a16="http://schemas.microsoft.com/office/drawing/2014/main" id="{2B6A2309-9DB4-1B91-A441-E0F383A06D7A}"/>
+              </a:ext>
+            </a:extLst>
+          </p:cNvPr>
+          <p:cNvSpPr txBox="1"/>
+          <p:nvPr/>
+        </p:nvSpPr>
+        <p:spPr>
+          <a:xfrm>
+            <a:off x="1906361" y="2413337"/>
+            <a:ext cx="8379278" cy="2031325"/>
+          </a:xfrm>
+          <a:prstGeom prst="rect">
+            <a:avLst/>
+          </a:prstGeom>
+          <a:noFill/>
+        </p:spPr>
+        <p:txBody>
+          <a:bodyPr wrap="square">
+            <a:spAutoFit/>
+          </a:bodyPr>
+          <a:lstStyle/>
+          <a:p>
+            <a:pPr algn="ctr"/>
+            <a:r>
+              <a:rPr lang="el-GR" dirty="0"/>
+              <a:t>Όπως πάντα, ο κώδικας και τα αρχεία που τον συνοδεύουν μπορούν να βρεθούν στον προσωπικό μου λογαριασμό στο </a:t>
+            </a:r>
+            <a:r>
+              <a:rPr lang="el-GR" dirty="0" err="1"/>
+              <a:t>Github</a:t>
+            </a:r>
+            <a:r>
+              <a:rPr lang="el-GR" dirty="0"/>
+              <a:t> </a:t>
+            </a:r>
+          </a:p>
+          <a:p>
+            <a:pPr algn="ctr"/>
+            <a:endParaRPr lang="el-GR" dirty="0"/>
+          </a:p>
+          <a:p>
+            <a:pPr algn="ctr"/>
+            <a:r>
+              <a:rPr lang="el-GR" dirty="0"/>
+              <a:t>(</a:t>
+            </a:r>
+            <a:r>
+              <a:rPr lang="en-US" dirty="0">
+                <a:solidFill>
+                  <a:schemeClr val="accent6">
+                    <a:lumMod val="20000"/>
+                    <a:lumOff val="80000"/>
+                  </a:schemeClr>
+                </a:solidFill>
+                <a:hlinkClick r:id="rId2">
+                  <a:extLst>
+                    <a:ext uri="{A12FA001-AC4F-418D-AE19-62706E023703}">
+                      <ahyp:hlinkClr xmlns:ahyp="http://schemas.microsoft.com/office/drawing/2018/hyperlinkcolor" val="tx"/>
+                    </a:ext>
+                  </a:extLst>
+                </a:hlinkClick>
+              </a:rPr>
+              <a:t>https://github.com/nadezsha/MSc---Applied-Meteorology-and-Environmental-Physics/tree/main/Radiation%20and%20Atmosphere%20Interaction</a:t>
+            </a:r>
+            <a:r>
+              <a:rPr lang="el-GR" dirty="0">
+                <a:ea typeface="+mn-lt"/>
+                <a:cs typeface="+mn-lt"/>
+              </a:rPr>
+              <a:t>)</a:t>
+            </a:r>
+          </a:p>
+          <a:p>
+            <a:pPr algn="ctr"/>
+            <a:endParaRPr lang="en-US" dirty="0"/>
+          </a:p>
+        </p:txBody>
+      </p:sp>
+    </p:spTree>
+    <p:extLst>
+      <p:ext uri="{BB962C8B-B14F-4D97-AF65-F5344CB8AC3E}">
+        <p14:creationId xmlns:p14="http://schemas.microsoft.com/office/powerpoint/2010/main" val="1132653034"/>
+      </p:ext>
+    </p:extLst>
+  </p:cSld>
+  <p:clrMapOvr>
+    <a:masterClrMapping/>
+  </p:clrMapOvr>
+</p:sld>
+</file>
+
 <file path=ppt/slides/slide2.xml><?xml version="1.0" encoding="utf-8"?>
 <p:sld xmlns:a="http://schemas.openxmlformats.org/drawingml/2006/main" xmlns:r="http://schemas.openxmlformats.org/officeDocument/2006/relationships" xmlns:p="http://schemas.openxmlformats.org/presentationml/2006/main">
   <p:cSld>
@@ -7674,8 +8106,8 @@
         </p:nvSpPr>
         <p:spPr>
           <a:xfrm>
-            <a:off x="5192486" y="188201"/>
-            <a:ext cx="6672943" cy="6463308"/>
+            <a:off x="4958918" y="49701"/>
+            <a:ext cx="7233082" cy="6740307"/>
           </a:xfrm>
           <a:prstGeom prst="rect">
             <a:avLst/>
@@ -7688,6 +8120,10 @@
           </a:bodyPr>
           <a:lstStyle/>
           <a:p>
+            <a:pPr marL="285750" indent="-285750">
+              <a:buFont typeface="Arial" panose="020B0604020202020204" pitchFamily="34" charset="0"/>
+              <a:buChar char="•"/>
+            </a:pPr>
             <a:r>
               <a:rPr lang="el-GR" dirty="0"/>
               <a:t>Όπως είναι αναμενόμενο παρατηρούμε ότι με την αύξηση των streams, οι αποκλίσεις μειώνονται για όλες τις </a:t>
@@ -7698,13 +8134,7 @@
             </a:r>
             <a:r>
               <a:rPr lang="el-GR" dirty="0"/>
-              <a:t> γωνίες. Αυτό συμβαίνει διότι με το να συμπεριλάβουμε στο μοντέλο μας περισσότερες γωνίες επηρεάζεται κυρίως η UVB η οποία είναι η ακτινοβολία που δέχεται την μεγαλύτερη επίδραση της ατμόσφαιρας (ευαίσθητη λόγω της σκέδασης Rayleigh)</a:t>
-            </a:r>
-          </a:p>
-          <a:p>
-            <a:r>
-              <a:rPr lang="el-GR" dirty="0"/>
-              <a:t>Τα 8 streams παρουσιάζουν σχεδόν μηδενική απόκλιση σε όλα τα διαγράμματα, δηλαδή ταυτίζονται με το πρότυπο που είναι τα 16 streams. Τα 4 streams παρουσιάζουν μικρές αποκλίσεις, οι οποίες εντοπίζονται κυρίως στα χαμηλά μήκη κύματος και φαίνεται να αυξάνουν ελάχιστα με την αύξηση της </a:t>
+              <a:t> γωνίες. Τα 8 streams παρουσιάζουν σχεδόν μηδενική απόκλιση σε όλα τα διαγράμματα, δηλαδή ταυτίζονται με το πρότυπο που είναι τα 16 streams. Τα 4 streams παρουσιάζουν μικρές αποκλίσεις, οι οποίες εντοπίζονται κυρίως στα χαμηλά μήκη κύματος και φαίνεται να αυξάνουν ελάχιστα με την αύξηση της </a:t>
             </a:r>
             <a:r>
               <a:rPr lang="el-GR" dirty="0" err="1"/>
@@ -7712,29 +8142,43 @@
             </a:r>
             <a:r>
               <a:rPr lang="el-GR" dirty="0"/>
-              <a:t> γωνίας. Παρόλα αυτά, ακόμα και για μεγάλες γωνίες οι αποκλίσεις αυτές είναι μικρότερες </a:t>
-            </a:r>
-            <a:r>
-              <a:rPr lang="el-GR"/>
-              <a:t>του </a:t>
-            </a:r>
+              <a:t> γωνίας. Παρόλα αυτά, ακόμα και για μεγάλες γωνίες οι αποκλίσεις αυτές είναι μικρότερες του 5%. Μπορούμε συνεπώς να συμπεράνουμε πως τα 4, τα 8 και τα 16 streams δεν παρουσιάζουν τόσο έντονες διαφοροποιήσεις έτσι ώστε να δικαιολογήσουμε την χρήση περισσότερων streams.</a:t>
+            </a:r>
+          </a:p>
+          <a:p>
+            <a:pPr marL="285750" indent="-285750">
+              <a:buFont typeface="Arial" panose="020B0604020202020204" pitchFamily="34" charset="0"/>
+              <a:buChar char="•"/>
+            </a:pPr>
             <a:r>
               <a:rPr lang="el-GR" dirty="0"/>
-              <a:t>5</a:t>
-            </a:r>
-            <a:r>
-              <a:rPr lang="el-GR"/>
-              <a:t>%. </a:t>
-            </a:r>
+              <a:t>Η μεγάλη απόκλιση παρατηρείται στα 2 streams και ειδικά στα μικρά μήκη κύματος. Αυτό συμβαίνει διότι με τόσο λίγα streams το μοντέλο αδυνατεί να αξιοποιήσει τις ακτίνες που προσπίπτουν πλάγια. Επιπρόσθετα, με το να συμπεριλάβουμε στο μοντέλο μας περισσότερες γωνίες επηρεάζεται κυρίως η UVB η οποία είναι η ακτινοβολία που δέχεται την μεγαλύτερη επίδραση της ατμόσφαιρας (ευαίσθητη λόγω της σκέδασης Rayleigh)</a:t>
+            </a:r>
+          </a:p>
+          <a:p>
+            <a:pPr marL="285750" indent="-285750">
+              <a:buFont typeface="Arial" panose="020B0604020202020204" pitchFamily="34" charset="0"/>
+              <a:buChar char="•"/>
+            </a:pPr>
             <a:r>
               <a:rPr lang="el-GR" dirty="0"/>
-              <a:t>Μπορούμε συνεπώς να συμπεράνουμε πως τα 4, τα 8 και τα 16 streams δεν παρουσιάζουν τόσο έντονες διαφοροποιήσεις έτσι ώστε να δικαιολογήσουμε την χρήση περισσότερων streams.</a:t>
-            </a:r>
-          </a:p>
-          <a:p>
+              <a:t>Για γωνίες μικρότερες των 40 παρατηρείται υπερεκτίμηση της ακτινοβολίας ενώ για μεγαλύτερες γωνίες υποεκτίμηση (με εξαίρεση τα 4 </a:t>
+            </a:r>
+            <a:r>
+              <a:rPr lang="el-GR" dirty="0" err="1"/>
+              <a:t>streams</a:t>
+            </a:r>
             <a:r>
               <a:rPr lang="el-GR" dirty="0"/>
-              <a:t>Η μεγάλη απόκλιση παρατηρείται στα 2 streams και ειδικά στα μικρά μήκη κύματος. Αυτό συμβαίνει διότι με τόσο λίγα streams το μοντέλο αδυνατεί να αξιοποιήσει τις ακτίνες που προσπίπτουν πλάγια. Για γωνίες μικρότερες των 40 παρατηρείται υπερεκτίμηση της ακτινοβολίας ενώ για μεγαλύτερες γωνίες υποεκτίμηση. Επιπρόσθετα, στις 85 μοίρες παρατηρούμε μεγάλη απόκλιση των 2 streams η οποία δεν περιορίζεται μόνο στα μικρά μήκη κύματος. </a:t>
+              <a:t> στα οποία έχουμε μόνιμη υποεκτίμηση). Επιπρόσθετα, στις 85 μοίρες παρατηρούμε σημαντική απόκλιση των 2 streams η οποία δεν περιορίζεται μόνο στα μικρά μήκη κύματος. Η γενική τάση είναι ότι οι αποκλίσεις αυξάνουν με την αύξηση της </a:t>
+            </a:r>
+            <a:r>
+              <a:rPr lang="el-GR" dirty="0" err="1"/>
+              <a:t>ζενίθιας</a:t>
+            </a:r>
+            <a:r>
+              <a:rPr lang="el-GR" dirty="0"/>
+              <a:t> γωνίας. </a:t>
             </a:r>
             <a:endParaRPr lang="en-US" dirty="0"/>
           </a:p>
@@ -8028,10 +8472,851 @@
           </a:prstGeom>
         </p:spPr>
       </p:pic>
+      <p:sp>
+        <p:nvSpPr>
+          <p:cNvPr id="4" name="TextBox 3">
+            <a:extLst>
+              <a:ext uri="{FF2B5EF4-FFF2-40B4-BE49-F238E27FC236}">
+                <a16:creationId xmlns:a16="http://schemas.microsoft.com/office/drawing/2014/main" id="{08337E70-A9E6-312D-7ABC-CDB0AE275686}"/>
+              </a:ext>
+            </a:extLst>
+          </p:cNvPr>
+          <p:cNvSpPr txBox="1"/>
+          <p:nvPr/>
+        </p:nvSpPr>
+        <p:spPr>
+          <a:xfrm>
+            <a:off x="4946349" y="-70508"/>
+            <a:ext cx="7245651" cy="7017306"/>
+          </a:xfrm>
+          <a:prstGeom prst="rect">
+            <a:avLst/>
+          </a:prstGeom>
+          <a:noFill/>
+        </p:spPr>
+        <p:txBody>
+          <a:bodyPr wrap="square" rtlCol="0">
+            <a:spAutoFit/>
+          </a:bodyPr>
+          <a:lstStyle/>
+          <a:p>
+            <a:pPr marL="285750" indent="-285750">
+              <a:buFont typeface="Arial" panose="020B0604020202020204" pitchFamily="34" charset="0"/>
+              <a:buChar char="•"/>
+            </a:pPr>
+            <a:r>
+              <a:rPr lang="el-GR" dirty="0"/>
+              <a:t>Στην περίπτωση της ακτινικής ροής παρατηρούμε</a:t>
+            </a:r>
+            <a:r>
+              <a:rPr lang="en-US" dirty="0"/>
+              <a:t> </a:t>
+            </a:r>
+            <a:r>
+              <a:rPr lang="el-GR" dirty="0"/>
+              <a:t>ξανά ότι όσο αυξάνονται τα </a:t>
+            </a:r>
+            <a:r>
+              <a:rPr lang="en-US" dirty="0"/>
+              <a:t>streams</a:t>
+            </a:r>
+            <a:r>
+              <a:rPr lang="el-GR" dirty="0"/>
+              <a:t>, τόσο καλύτερη συμφωνία έχουμε με το πρότυπο.</a:t>
+            </a:r>
+            <a:r>
+              <a:rPr lang="en-US" dirty="0"/>
+              <a:t> </a:t>
+            </a:r>
+            <a:r>
+              <a:rPr lang="el-GR" dirty="0"/>
+              <a:t>Αξίζει να σημειωθεί πως στην περίπτωση της ολικής ακτινοβολίας, τόσο τα 4 όσο και τα 8 </a:t>
+            </a:r>
+            <a:r>
+              <a:rPr lang="el-GR" dirty="0" err="1"/>
+              <a:t>streams</a:t>
+            </a:r>
+            <a:r>
+              <a:rPr lang="el-GR" dirty="0"/>
+              <a:t> ταυτιζόντουσαν για το μεγαλύτερο μέρος του φάσματος ενώ εδώ παρατηρούνται αποκλίσεις.</a:t>
+            </a:r>
+            <a:endParaRPr lang="en-US" dirty="0"/>
+          </a:p>
+          <a:p>
+            <a:pPr marL="285750" indent="-285750">
+              <a:buFont typeface="Arial" panose="020B0604020202020204" pitchFamily="34" charset="0"/>
+              <a:buChar char="•"/>
+            </a:pPr>
+            <a:r>
+              <a:rPr lang="el-GR" dirty="0"/>
+              <a:t>Παρατηρούνται επίσης διακυμάνσεις με το μήκος κύματος και συγκεκριμένα κοντά στα 750 </a:t>
+            </a:r>
+            <a:r>
+              <a:rPr lang="en-US" dirty="0"/>
+              <a:t>nm</a:t>
+            </a:r>
+            <a:r>
+              <a:rPr lang="el-GR" dirty="0"/>
+              <a:t> εντοπίζουμε ένα </a:t>
+            </a:r>
+            <a:r>
+              <a:rPr lang="en-US" dirty="0"/>
+              <a:t>peak </a:t>
+            </a:r>
+            <a:r>
+              <a:rPr lang="el-GR" dirty="0"/>
+              <a:t>όπου όλα τα </a:t>
+            </a:r>
+            <a:r>
+              <a:rPr lang="en-US" dirty="0"/>
+              <a:t>streams</a:t>
+            </a:r>
+            <a:r>
+              <a:rPr lang="el-GR" dirty="0"/>
+              <a:t> τείνουν να συμπίπτουν. Αυτό συμβαίνει λόγω των γραμμών απορρόφησης των αερίων στην ατμόσφαιρα. Το πόσα φωτόνια επιτρέπεται να περάσουν εξαρτάται κάθε φορά από την </a:t>
+            </a:r>
+            <a:r>
+              <a:rPr lang="el-GR" dirty="0" err="1"/>
+              <a:t>ζενίθια</a:t>
+            </a:r>
+            <a:r>
+              <a:rPr lang="el-GR" dirty="0"/>
+              <a:t> γωνία. Χαρακτηριστικό παράδειγμα είναι στις 85 μοίρες όπου η εξασθένηση είναι τόση ώστε τα διάφορα </a:t>
+            </a:r>
+            <a:r>
+              <a:rPr lang="el-GR" dirty="0" err="1"/>
+              <a:t>peaks</a:t>
+            </a:r>
+            <a:r>
+              <a:rPr lang="en-US" dirty="0"/>
+              <a:t> </a:t>
+            </a:r>
+            <a:r>
+              <a:rPr lang="el-GR" dirty="0"/>
+              <a:t>να τείνουν να εξομαλυνθούν. Αυτό συμβαίνει καθώς στις μεγάλες γωνίες όπου αυξάνεται ο οπτικός δρόμος, τα φωτόνια είναι πλέον λίγα σε αριθμό και όπως γνωρίζουμε με βάση την θεωρία </a:t>
+            </a:r>
+            <a:r>
+              <a:rPr lang="el-GR" dirty="0" err="1"/>
+              <a:t>Chapman</a:t>
+            </a:r>
+            <a:r>
+              <a:rPr lang="el-GR" dirty="0"/>
+              <a:t>, το πόση ακτινοβολία θα χαθεί εξαρτάται από τον αριθμό των διαθέσιμων φωτονίων.</a:t>
+            </a:r>
+          </a:p>
+          <a:p>
+            <a:pPr marL="285750" indent="-285750">
+              <a:buFont typeface="Arial" panose="020B0604020202020204" pitchFamily="34" charset="0"/>
+              <a:buChar char="•"/>
+            </a:pPr>
+            <a:r>
+              <a:rPr lang="el-GR" dirty="0"/>
+              <a:t>Ομοίως με την περίπτωση της ολικής ακτινοβολίας, και εδώ παρατηρούμε ότι με την αύξηση της </a:t>
+            </a:r>
+            <a:r>
+              <a:rPr lang="el-GR" dirty="0" err="1"/>
+              <a:t>ζενίθιας</a:t>
+            </a:r>
+            <a:r>
+              <a:rPr lang="el-GR" dirty="0"/>
+              <a:t> γωνίας αυξάνονται οι αποκλίσεις. Αντιθέτως, οι αποκλίσεις μειώνονται με την αύξηση του μήκους κύματος.</a:t>
+            </a:r>
+          </a:p>
+          <a:p>
+            <a:pPr marL="285750" indent="-285750">
+              <a:buFont typeface="Arial" panose="020B0604020202020204" pitchFamily="34" charset="0"/>
+              <a:buChar char="•"/>
+            </a:pPr>
+            <a:r>
+              <a:rPr lang="el-GR" dirty="0"/>
+              <a:t>Στα 2 </a:t>
+            </a:r>
+            <a:r>
+              <a:rPr lang="el-GR" dirty="0" err="1"/>
+              <a:t>streams</a:t>
+            </a:r>
+            <a:r>
+              <a:rPr lang="en-US" dirty="0"/>
+              <a:t>, </a:t>
+            </a:r>
+            <a:r>
+              <a:rPr lang="el-GR" dirty="0"/>
+              <a:t>παρατηρούμε ένα ελάχιστο που ξεκινάει κοντά στα 350 </a:t>
+            </a:r>
+            <a:r>
+              <a:rPr lang="el-GR" dirty="0" err="1"/>
+              <a:t>nm</a:t>
+            </a:r>
+            <a:r>
+              <a:rPr lang="el-GR" dirty="0"/>
+              <a:t> στις 10 μοίρες και ξεπερνάει τα 400 </a:t>
+            </a:r>
+            <a:r>
+              <a:rPr lang="el-GR" dirty="0" err="1"/>
+              <a:t>nm</a:t>
+            </a:r>
+            <a:r>
+              <a:rPr lang="el-GR" dirty="0"/>
+              <a:t> στις 85 μοίρες δηλαδή το ελάχιστο μετατοπίζεται προς μεγαλύτερα μήκη κύματος με την αύξηση της </a:t>
+            </a:r>
+            <a:r>
+              <a:rPr lang="el-GR" dirty="0" err="1"/>
+              <a:t>ζενίθιας</a:t>
+            </a:r>
+            <a:r>
+              <a:rPr lang="el-GR" dirty="0"/>
+              <a:t> γωνίας. Το ελάχιστο υποδηλώνει ότι γίνονται πολλαπλές σκεδάσεις και δεν φτάνουν πολλά φωτόνια στο έδαφος.</a:t>
+            </a:r>
+            <a:endParaRPr lang="en-US" dirty="0"/>
+          </a:p>
+        </p:txBody>
+      </p:sp>
     </p:spTree>
     <p:extLst>
       <p:ext uri="{BB962C8B-B14F-4D97-AF65-F5344CB8AC3E}">
         <p14:creationId xmlns:p14="http://schemas.microsoft.com/office/powerpoint/2010/main" val="3177405139"/>
+      </p:ext>
+    </p:extLst>
+  </p:cSld>
+  <p:clrMapOvr>
+    <a:masterClrMapping/>
+  </p:clrMapOvr>
+</p:sld>
+</file>
+
+<file path=ppt/slides/slide7.xml><?xml version="1.0" encoding="utf-8"?>
+<p:sld xmlns:a="http://schemas.openxmlformats.org/drawingml/2006/main" xmlns:r="http://schemas.openxmlformats.org/officeDocument/2006/relationships" xmlns:p="http://schemas.openxmlformats.org/presentationml/2006/main">
+  <p:cSld>
+    <p:spTree>
+      <p:nvGrpSpPr>
+        <p:cNvPr id="1" name=""/>
+        <p:cNvGrpSpPr/>
+        <p:nvPr/>
+      </p:nvGrpSpPr>
+      <p:grpSpPr>
+        <a:xfrm>
+          <a:off x="0" y="0"/>
+          <a:ext cx="0" cy="0"/>
+          <a:chOff x="0" y="0"/>
+          <a:chExt cx="0" cy="0"/>
+        </a:xfrm>
+      </p:grpSpPr>
+      <p:sp>
+        <p:nvSpPr>
+          <p:cNvPr id="2" name="TextBox 1">
+            <a:extLst>
+              <a:ext uri="{FF2B5EF4-FFF2-40B4-BE49-F238E27FC236}">
+                <a16:creationId xmlns:a16="http://schemas.microsoft.com/office/drawing/2014/main" id="{614668A3-5691-2B34-4E3B-E09DEEFEBFAA}"/>
+              </a:ext>
+            </a:extLst>
+          </p:cNvPr>
+          <p:cNvSpPr txBox="1"/>
+          <p:nvPr/>
+        </p:nvSpPr>
+        <p:spPr>
+          <a:xfrm>
+            <a:off x="582386" y="432387"/>
+            <a:ext cx="5116286" cy="584775"/>
+          </a:xfrm>
+          <a:prstGeom prst="rect">
+            <a:avLst/>
+          </a:prstGeom>
+          <a:noFill/>
+        </p:spPr>
+        <p:txBody>
+          <a:bodyPr wrap="square" rtlCol="0">
+            <a:spAutoFit/>
+          </a:bodyPr>
+          <a:lstStyle/>
+          <a:p>
+            <a:r>
+              <a:rPr lang="el-GR" sz="3200" b="1" dirty="0"/>
+              <a:t>ΠΡΩΤΑ ΣΥΜΠΕΡΑΣΜΑΤΑ</a:t>
+            </a:r>
+            <a:endParaRPr lang="en-US" sz="3200" b="1" dirty="0"/>
+          </a:p>
+        </p:txBody>
+      </p:sp>
+      <p:sp>
+        <p:nvSpPr>
+          <p:cNvPr id="3" name="TextBox 2">
+            <a:extLst>
+              <a:ext uri="{FF2B5EF4-FFF2-40B4-BE49-F238E27FC236}">
+                <a16:creationId xmlns:a16="http://schemas.microsoft.com/office/drawing/2014/main" id="{22A95FE6-5A32-E0D3-B078-A27FC48A02C8}"/>
+              </a:ext>
+            </a:extLst>
+          </p:cNvPr>
+          <p:cNvSpPr txBox="1"/>
+          <p:nvPr/>
+        </p:nvSpPr>
+        <p:spPr>
+          <a:xfrm>
+            <a:off x="500743" y="1803967"/>
+            <a:ext cx="11277600" cy="3693319"/>
+          </a:xfrm>
+          <a:prstGeom prst="rect">
+            <a:avLst/>
+          </a:prstGeom>
+          <a:noFill/>
+        </p:spPr>
+        <p:txBody>
+          <a:bodyPr wrap="square" rtlCol="0">
+            <a:spAutoFit/>
+          </a:bodyPr>
+          <a:lstStyle/>
+          <a:p>
+            <a:pPr marL="285750" indent="-285750">
+              <a:buFont typeface="Arial" panose="020B0604020202020204" pitchFamily="34" charset="0"/>
+              <a:buChar char="•"/>
+            </a:pPr>
+            <a:r>
+              <a:rPr lang="el-GR" dirty="0"/>
+              <a:t>ΑΡΙΘΜΟΣ STREAMS : Τα 2 </a:t>
+            </a:r>
+            <a:r>
+              <a:rPr lang="el-GR" dirty="0" err="1"/>
+              <a:t>streams</a:t>
+            </a:r>
+            <a:r>
+              <a:rPr lang="el-GR" dirty="0"/>
+              <a:t> αλλάζουν τον οπτικό δρόμο των φωτονίων, αναγκάζοντάς τα να διανύουν μία κάθετη απόσταση με μόνο 2 διευθύνσεις (προς τα πάνω και προς τα κάτω). Αυτό έχει σαν αποτέλεσμα, η διαδρομή που ακολουθούν τα φωτόνια να είναι μικρότερη από την  πραγματική και συνεπώς να υπόκεινται σε λιγότερες σκεδάσεις και να φτάνει στο έδαφος μεγαλύτερος αριθμός φωτονίων. Αυτό οδηγεί σε σφάλματα και αποκλίσεις οι οποίες μειώνονται με την αύξηση του αριθμού των </a:t>
+            </a:r>
+            <a:r>
+              <a:rPr lang="en-US" dirty="0"/>
+              <a:t>streams </a:t>
+            </a:r>
+            <a:r>
+              <a:rPr lang="el-GR" dirty="0"/>
+              <a:t>καθώς το μοντέλο, λαμβάνοντας υπόψιν περισσότερες γωνίες, κάνει και καλύτερους υπολογισμούς.</a:t>
+            </a:r>
+          </a:p>
+          <a:p>
+            <a:pPr marL="285750" indent="-285750">
+              <a:buFont typeface="Arial" panose="020B0604020202020204" pitchFamily="34" charset="0"/>
+              <a:buChar char="•"/>
+            </a:pPr>
+            <a:r>
+              <a:rPr lang="el-GR" dirty="0"/>
+              <a:t>ΖΕΝΙΘΙΑ ΓΩΝΙΑ : Σε μικρές γωνίες, τα σφάλματα τείνουν να είναι αμελητέα και να μεγαλώνουν με την αύξηση της </a:t>
+            </a:r>
+            <a:r>
+              <a:rPr lang="el-GR" dirty="0" err="1"/>
+              <a:t>ζενίθιας</a:t>
+            </a:r>
+            <a:r>
+              <a:rPr lang="el-GR" dirty="0"/>
+              <a:t> γωνίας. Αυτό συμβαίνει καθώς σε μεγάλες γωνίες κυριαρχεί η συνιστώσα της διάχυτης ακτινοβολίας.</a:t>
+            </a:r>
+          </a:p>
+          <a:p>
+            <a:pPr marL="285750" indent="-285750">
+              <a:buFont typeface="Arial" panose="020B0604020202020204" pitchFamily="34" charset="0"/>
+              <a:buChar char="•"/>
+            </a:pPr>
+            <a:r>
+              <a:rPr lang="el-GR" dirty="0"/>
+              <a:t>ΜΗΚΟΣ ΚΥΜΑΤΟΣ : Το μήκος κύματος παίζει σημαντικό ρόλο στην σκέδαση και συγκεκριμένα η εξασθένηση της ακτινοβολίας λόγω της σκέδασης δεν είναι ίδια για όλα τα μήκη κύματος. Η σκέδαση </a:t>
+            </a:r>
+            <a:r>
+              <a:rPr lang="el-GR" dirty="0" err="1"/>
+              <a:t>Rayleigh</a:t>
+            </a:r>
+            <a:r>
+              <a:rPr lang="el-GR" dirty="0"/>
+              <a:t> είναι πιο έντονη στα μικρά μήκη κύματος δηλαδή επηρεάζεται περισσότερο το υπεριώδες μέρος του φάσματος και τα σφάλματα είναι πιο έντονα εδώ όπου η σκέδαση είναι πιο έντονη.</a:t>
+            </a:r>
+          </a:p>
+          <a:p>
+            <a:endParaRPr lang="en-US" dirty="0"/>
+          </a:p>
+        </p:txBody>
+      </p:sp>
+      <p:sp>
+        <p:nvSpPr>
+          <p:cNvPr id="4" name="TextBox 3">
+            <a:extLst>
+              <a:ext uri="{FF2B5EF4-FFF2-40B4-BE49-F238E27FC236}">
+                <a16:creationId xmlns:a16="http://schemas.microsoft.com/office/drawing/2014/main" id="{4E689DF1-6E92-8F33-8781-0FD99E2FFC32}"/>
+              </a:ext>
+            </a:extLst>
+          </p:cNvPr>
+          <p:cNvSpPr txBox="1"/>
+          <p:nvPr/>
+        </p:nvSpPr>
+        <p:spPr>
+          <a:xfrm>
+            <a:off x="582386" y="1272847"/>
+            <a:ext cx="10069286" cy="369332"/>
+          </a:xfrm>
+          <a:prstGeom prst="rect">
+            <a:avLst/>
+          </a:prstGeom>
+          <a:noFill/>
+        </p:spPr>
+        <p:txBody>
+          <a:bodyPr wrap="square" rtlCol="0">
+            <a:spAutoFit/>
+          </a:bodyPr>
+          <a:lstStyle/>
+          <a:p>
+            <a:r>
+              <a:rPr lang="el-GR" dirty="0"/>
+              <a:t>Οι μεταβολές που παρατηρήσαμε μπορούν να κατηγοριοποιηθούν στις εξής 3 παραμέτρους:</a:t>
+            </a:r>
+            <a:endParaRPr lang="en-US" dirty="0"/>
+          </a:p>
+        </p:txBody>
+      </p:sp>
+      <p:sp>
+        <p:nvSpPr>
+          <p:cNvPr id="5" name="TextBox 4">
+            <a:extLst>
+              <a:ext uri="{FF2B5EF4-FFF2-40B4-BE49-F238E27FC236}">
+                <a16:creationId xmlns:a16="http://schemas.microsoft.com/office/drawing/2014/main" id="{A88D6CF9-9B54-7CFC-3311-261D80EA14DE}"/>
+              </a:ext>
+            </a:extLst>
+          </p:cNvPr>
+          <p:cNvSpPr txBox="1"/>
+          <p:nvPr/>
+        </p:nvSpPr>
+        <p:spPr>
+          <a:xfrm>
+            <a:off x="500743" y="5344886"/>
+            <a:ext cx="11691258" cy="1200329"/>
+          </a:xfrm>
+          <a:prstGeom prst="rect">
+            <a:avLst/>
+          </a:prstGeom>
+          <a:noFill/>
+        </p:spPr>
+        <p:txBody>
+          <a:bodyPr wrap="square" rtlCol="0">
+            <a:spAutoFit/>
+          </a:bodyPr>
+          <a:lstStyle/>
+          <a:p>
+            <a:r>
+              <a:rPr lang="el-GR" dirty="0"/>
+              <a:t>Κάτι επιπρόσθετο που πρέπει να συζητηθεί είναι το γεγονός ότι στην ακτινική ροή οι διακυμάνσεις φαίνονται πιο έντονες σε σχέση με την ολική ακτινοβολία. Αυτό οφείλεται στο ότι το ποσοστό της διάχυτης συνιστώσας της ακτινοβολίας είναι μεγαλύτερο στην ακτινική ροή άρα και το σφάλμα πιο σημαντικό. Για τον λόγο αυτό παρουσιάζουμε στην συνέχεια τα διαγράμματα της άμεσης και της διάχυτης ακτινοβολίας για τις διάφορες </a:t>
+            </a:r>
+            <a:r>
+              <a:rPr lang="el-GR" dirty="0" err="1"/>
+              <a:t>ζενίθιες</a:t>
+            </a:r>
+            <a:r>
+              <a:rPr lang="el-GR" dirty="0"/>
+              <a:t> γωνίες.</a:t>
+            </a:r>
+            <a:endParaRPr lang="en-US" dirty="0"/>
+          </a:p>
+        </p:txBody>
+      </p:sp>
+    </p:spTree>
+    <p:extLst>
+      <p:ext uri="{BB962C8B-B14F-4D97-AF65-F5344CB8AC3E}">
+        <p14:creationId xmlns:p14="http://schemas.microsoft.com/office/powerpoint/2010/main" val="832519296"/>
+      </p:ext>
+    </p:extLst>
+  </p:cSld>
+  <p:clrMapOvr>
+    <a:masterClrMapping/>
+  </p:clrMapOvr>
+</p:sld>
+</file>
+
+<file path=ppt/slides/slide8.xml><?xml version="1.0" encoding="utf-8"?>
+<p:sld xmlns:a="http://schemas.openxmlformats.org/drawingml/2006/main" xmlns:r="http://schemas.openxmlformats.org/officeDocument/2006/relationships" xmlns:p="http://schemas.openxmlformats.org/presentationml/2006/main">
+  <p:cSld>
+    <p:spTree>
+      <p:nvGrpSpPr>
+        <p:cNvPr id="1" name=""/>
+        <p:cNvGrpSpPr/>
+        <p:nvPr/>
+      </p:nvGrpSpPr>
+      <p:grpSpPr>
+        <a:xfrm>
+          <a:off x="0" y="0"/>
+          <a:ext cx="0" cy="0"/>
+          <a:chOff x="0" y="0"/>
+          <a:chExt cx="0" cy="0"/>
+        </a:xfrm>
+      </p:grpSpPr>
+      <p:pic>
+        <p:nvPicPr>
+          <p:cNvPr id="7" name="Picture 6" descr="A graph with lines and numbers&#10;&#10;Description automatically generated">
+            <a:extLst>
+              <a:ext uri="{FF2B5EF4-FFF2-40B4-BE49-F238E27FC236}">
+                <a16:creationId xmlns:a16="http://schemas.microsoft.com/office/drawing/2014/main" id="{1EB8D05E-1216-715E-13C7-5A05C3420E0D}"/>
+              </a:ext>
+            </a:extLst>
+          </p:cNvPr>
+          <p:cNvPicPr>
+            <a:picLocks noChangeAspect="1"/>
+          </p:cNvPicPr>
+          <p:nvPr/>
+        </p:nvPicPr>
+        <p:blipFill>
+          <a:blip r:embed="rId2">
+            <a:extLst>
+              <a:ext uri="{28A0092B-C50C-407E-A947-70E740481C1C}">
+                <a14:useLocalDpi xmlns:a14="http://schemas.microsoft.com/office/drawing/2010/main" val="0"/>
+              </a:ext>
+            </a:extLst>
+          </a:blip>
+          <a:stretch>
+            <a:fillRect/>
+          </a:stretch>
+        </p:blipFill>
+        <p:spPr>
+          <a:xfrm>
+            <a:off x="6096000" y="9145"/>
+            <a:ext cx="4559808" cy="3419856"/>
+          </a:xfrm>
+          <a:prstGeom prst="rect">
+            <a:avLst/>
+          </a:prstGeom>
+        </p:spPr>
+      </p:pic>
+      <p:pic>
+        <p:nvPicPr>
+          <p:cNvPr id="9" name="Picture 8" descr="A graph with lines and numbers&#10;&#10;Description automatically generated">
+            <a:extLst>
+              <a:ext uri="{FF2B5EF4-FFF2-40B4-BE49-F238E27FC236}">
+                <a16:creationId xmlns:a16="http://schemas.microsoft.com/office/drawing/2014/main" id="{DAEA13F5-388F-C176-190F-2B340B8F06EA}"/>
+              </a:ext>
+            </a:extLst>
+          </p:cNvPr>
+          <p:cNvPicPr>
+            <a:picLocks noChangeAspect="1"/>
+          </p:cNvPicPr>
+          <p:nvPr/>
+        </p:nvPicPr>
+        <p:blipFill>
+          <a:blip r:embed="rId3">
+            <a:extLst>
+              <a:ext uri="{28A0092B-C50C-407E-A947-70E740481C1C}">
+                <a14:useLocalDpi xmlns:a14="http://schemas.microsoft.com/office/drawing/2010/main" val="0"/>
+              </a:ext>
+            </a:extLst>
+          </a:blip>
+          <a:stretch>
+            <a:fillRect/>
+          </a:stretch>
+        </p:blipFill>
+        <p:spPr>
+          <a:xfrm>
+            <a:off x="1536192" y="3428999"/>
+            <a:ext cx="4559808" cy="3419856"/>
+          </a:xfrm>
+          <a:prstGeom prst="rect">
+            <a:avLst/>
+          </a:prstGeom>
+        </p:spPr>
+      </p:pic>
+      <p:pic>
+        <p:nvPicPr>
+          <p:cNvPr id="11" name="Picture 10" descr="A graph of a graph showing a wave&#10;&#10;Description automatically generated with medium confidence">
+            <a:extLst>
+              <a:ext uri="{FF2B5EF4-FFF2-40B4-BE49-F238E27FC236}">
+                <a16:creationId xmlns:a16="http://schemas.microsoft.com/office/drawing/2014/main" id="{AB159B17-AC34-2F8D-BAEF-20E2DD9879A8}"/>
+              </a:ext>
+            </a:extLst>
+          </p:cNvPr>
+          <p:cNvPicPr>
+            <a:picLocks noChangeAspect="1"/>
+          </p:cNvPicPr>
+          <p:nvPr/>
+        </p:nvPicPr>
+        <p:blipFill>
+          <a:blip r:embed="rId4">
+            <a:extLst>
+              <a:ext uri="{28A0092B-C50C-407E-A947-70E740481C1C}">
+                <a14:useLocalDpi xmlns:a14="http://schemas.microsoft.com/office/drawing/2010/main" val="0"/>
+              </a:ext>
+            </a:extLst>
+          </a:blip>
+          <a:stretch>
+            <a:fillRect/>
+          </a:stretch>
+        </p:blipFill>
+        <p:spPr>
+          <a:xfrm>
+            <a:off x="6096000" y="3428999"/>
+            <a:ext cx="4559808" cy="3419856"/>
+          </a:xfrm>
+          <a:prstGeom prst="rect">
+            <a:avLst/>
+          </a:prstGeom>
+        </p:spPr>
+      </p:pic>
+      <p:pic>
+        <p:nvPicPr>
+          <p:cNvPr id="13" name="Picture 12" descr="A graph of a graph showing a wave">
+            <a:extLst>
+              <a:ext uri="{FF2B5EF4-FFF2-40B4-BE49-F238E27FC236}">
+                <a16:creationId xmlns:a16="http://schemas.microsoft.com/office/drawing/2014/main" id="{030A6D4A-B225-099E-9377-526445906B3C}"/>
+              </a:ext>
+            </a:extLst>
+          </p:cNvPr>
+          <p:cNvPicPr>
+            <a:picLocks noChangeAspect="1"/>
+          </p:cNvPicPr>
+          <p:nvPr/>
+        </p:nvPicPr>
+        <p:blipFill>
+          <a:blip r:embed="rId5">
+            <a:extLst>
+              <a:ext uri="{28A0092B-C50C-407E-A947-70E740481C1C}">
+                <a14:useLocalDpi xmlns:a14="http://schemas.microsoft.com/office/drawing/2010/main" val="0"/>
+              </a:ext>
+            </a:extLst>
+          </a:blip>
+          <a:stretch>
+            <a:fillRect/>
+          </a:stretch>
+        </p:blipFill>
+        <p:spPr>
+          <a:xfrm>
+            <a:off x="1536192" y="0"/>
+            <a:ext cx="4559808" cy="3419856"/>
+          </a:xfrm>
+          <a:prstGeom prst="rect">
+            <a:avLst/>
+          </a:prstGeom>
+        </p:spPr>
+      </p:pic>
+      <p:sp>
+        <p:nvSpPr>
+          <p:cNvPr id="14" name="TextBox 13">
+            <a:extLst>
+              <a:ext uri="{FF2B5EF4-FFF2-40B4-BE49-F238E27FC236}">
+                <a16:creationId xmlns:a16="http://schemas.microsoft.com/office/drawing/2014/main" id="{131149DB-1003-3E26-BD3E-7BD29CAC9086}"/>
+              </a:ext>
+            </a:extLst>
+          </p:cNvPr>
+          <p:cNvSpPr txBox="1"/>
+          <p:nvPr/>
+        </p:nvSpPr>
+        <p:spPr>
+          <a:xfrm rot="16200000">
+            <a:off x="-163284" y="3244334"/>
+            <a:ext cx="2079170" cy="369332"/>
+          </a:xfrm>
+          <a:prstGeom prst="rect">
+            <a:avLst/>
+          </a:prstGeom>
+          <a:noFill/>
+        </p:spPr>
+        <p:txBody>
+          <a:bodyPr wrap="square" rtlCol="0">
+            <a:spAutoFit/>
+          </a:bodyPr>
+          <a:lstStyle/>
+          <a:p>
+            <a:r>
+              <a:rPr lang="el-GR" dirty="0"/>
+              <a:t>Άμεση ακτινοβολία</a:t>
+            </a:r>
+            <a:endParaRPr lang="en-US" dirty="0"/>
+          </a:p>
+        </p:txBody>
+      </p:sp>
+    </p:spTree>
+    <p:extLst>
+      <p:ext uri="{BB962C8B-B14F-4D97-AF65-F5344CB8AC3E}">
+        <p14:creationId xmlns:p14="http://schemas.microsoft.com/office/powerpoint/2010/main" val="2744015384"/>
+      </p:ext>
+    </p:extLst>
+  </p:cSld>
+  <p:clrMapOvr>
+    <a:masterClrMapping/>
+  </p:clrMapOvr>
+</p:sld>
+</file>
+
+<file path=ppt/slides/slide9.xml><?xml version="1.0" encoding="utf-8"?>
+<p:sld xmlns:a="http://schemas.openxmlformats.org/drawingml/2006/main" xmlns:r="http://schemas.openxmlformats.org/officeDocument/2006/relationships" xmlns:p="http://schemas.openxmlformats.org/presentationml/2006/main">
+  <p:cSld>
+    <p:spTree>
+      <p:nvGrpSpPr>
+        <p:cNvPr id="1" name=""/>
+        <p:cNvGrpSpPr/>
+        <p:nvPr/>
+      </p:nvGrpSpPr>
+      <p:grpSpPr>
+        <a:xfrm>
+          <a:off x="0" y="0"/>
+          <a:ext cx="0" cy="0"/>
+          <a:chOff x="0" y="0"/>
+          <a:chExt cx="0" cy="0"/>
+        </a:xfrm>
+      </p:grpSpPr>
+      <p:pic>
+        <p:nvPicPr>
+          <p:cNvPr id="2" name="Picture 1" descr="A graph with a line and numbers&#10;&#10;Description automatically generated with medium confidence">
+            <a:extLst>
+              <a:ext uri="{FF2B5EF4-FFF2-40B4-BE49-F238E27FC236}">
+                <a16:creationId xmlns:a16="http://schemas.microsoft.com/office/drawing/2014/main" id="{17BF058B-5CB4-7957-7467-7055E2588EB0}"/>
+              </a:ext>
+            </a:extLst>
+          </p:cNvPr>
+          <p:cNvPicPr>
+            <a:picLocks noChangeAspect="1"/>
+          </p:cNvPicPr>
+          <p:nvPr/>
+        </p:nvPicPr>
+        <p:blipFill>
+          <a:blip r:embed="rId2">
+            <a:extLst>
+              <a:ext uri="{28A0092B-C50C-407E-A947-70E740481C1C}">
+                <a14:useLocalDpi xmlns:a14="http://schemas.microsoft.com/office/drawing/2010/main" val="0"/>
+              </a:ext>
+            </a:extLst>
+          </a:blip>
+          <a:stretch>
+            <a:fillRect/>
+          </a:stretch>
+        </p:blipFill>
+        <p:spPr>
+          <a:xfrm>
+            <a:off x="734131" y="0"/>
+            <a:ext cx="4559808" cy="3419856"/>
+          </a:xfrm>
+          <a:prstGeom prst="rect">
+            <a:avLst/>
+          </a:prstGeom>
+        </p:spPr>
+      </p:pic>
+      <p:pic>
+        <p:nvPicPr>
+          <p:cNvPr id="3" name="Picture 2" descr="A graph of a graph showing a line">
+            <a:extLst>
+              <a:ext uri="{FF2B5EF4-FFF2-40B4-BE49-F238E27FC236}">
+                <a16:creationId xmlns:a16="http://schemas.microsoft.com/office/drawing/2014/main" id="{C993D6F3-5099-BD99-696B-E24BAAC89B60}"/>
+              </a:ext>
+            </a:extLst>
+          </p:cNvPr>
+          <p:cNvPicPr>
+            <a:picLocks noChangeAspect="1"/>
+          </p:cNvPicPr>
+          <p:nvPr/>
+        </p:nvPicPr>
+        <p:blipFill>
+          <a:blip r:embed="rId3">
+            <a:extLst>
+              <a:ext uri="{28A0092B-C50C-407E-A947-70E740481C1C}">
+                <a14:useLocalDpi xmlns:a14="http://schemas.microsoft.com/office/drawing/2010/main" val="0"/>
+              </a:ext>
+            </a:extLst>
+          </a:blip>
+          <a:stretch>
+            <a:fillRect/>
+          </a:stretch>
+        </p:blipFill>
+        <p:spPr>
+          <a:xfrm>
+            <a:off x="734131" y="3419856"/>
+            <a:ext cx="4559808" cy="3419856"/>
+          </a:xfrm>
+          <a:prstGeom prst="rect">
+            <a:avLst/>
+          </a:prstGeom>
+        </p:spPr>
+      </p:pic>
+      <p:sp>
+        <p:nvSpPr>
+          <p:cNvPr id="4" name="TextBox 3">
+            <a:extLst>
+              <a:ext uri="{FF2B5EF4-FFF2-40B4-BE49-F238E27FC236}">
+                <a16:creationId xmlns:a16="http://schemas.microsoft.com/office/drawing/2014/main" id="{59070D73-0F9A-41A7-7207-7900C642F262}"/>
+              </a:ext>
+            </a:extLst>
+          </p:cNvPr>
+          <p:cNvSpPr txBox="1"/>
+          <p:nvPr/>
+        </p:nvSpPr>
+        <p:spPr>
+          <a:xfrm>
+            <a:off x="5660571" y="555171"/>
+            <a:ext cx="5976258" cy="2308324"/>
+          </a:xfrm>
+          <a:prstGeom prst="rect">
+            <a:avLst/>
+          </a:prstGeom>
+          <a:noFill/>
+        </p:spPr>
+        <p:txBody>
+          <a:bodyPr wrap="square" rtlCol="0">
+            <a:spAutoFit/>
+          </a:bodyPr>
+          <a:lstStyle/>
+          <a:p>
+            <a:pPr marL="285750" indent="-285750">
+              <a:buFont typeface="Arial" panose="020B0604020202020204" pitchFamily="34" charset="0"/>
+              <a:buChar char="•"/>
+            </a:pPr>
+            <a:r>
+              <a:rPr lang="el-GR" dirty="0"/>
+              <a:t>Όπως είναι αναμενόμενο, παρατηρούμε ότι για τα 4 και τα 8 </a:t>
+            </a:r>
+            <a:r>
+              <a:rPr lang="en-US" dirty="0"/>
+              <a:t>streams</a:t>
+            </a:r>
+            <a:r>
+              <a:rPr lang="el-GR" dirty="0"/>
+              <a:t> οι αποκλίσεις στην άμεση ακτινοβολία είναι μηδενικές τόσο για όλα τα μέρη του φάσματος της ακτινοβολίας όσο και για όλες τις υπό μελέτη </a:t>
+            </a:r>
+            <a:r>
+              <a:rPr lang="el-GR" dirty="0" err="1"/>
+              <a:t>ζενίθιες</a:t>
+            </a:r>
+            <a:r>
+              <a:rPr lang="el-GR" dirty="0"/>
+              <a:t> γωνίες.</a:t>
+            </a:r>
+          </a:p>
+          <a:p>
+            <a:pPr marL="285750" indent="-285750">
+              <a:buFont typeface="Arial" panose="020B0604020202020204" pitchFamily="34" charset="0"/>
+              <a:buChar char="•"/>
+            </a:pPr>
+            <a:r>
+              <a:rPr lang="el-GR" dirty="0"/>
+              <a:t>Αποκλίσεις παρατηρούνται στα 2 </a:t>
+            </a:r>
+            <a:r>
+              <a:rPr lang="el-GR" dirty="0" err="1"/>
+              <a:t>streams</a:t>
+            </a:r>
+            <a:r>
+              <a:rPr lang="el-GR" dirty="0"/>
+              <a:t> οι οποίες αυξάνονται με την αύξηση της </a:t>
+            </a:r>
+            <a:r>
+              <a:rPr lang="el-GR" dirty="0" err="1"/>
+              <a:t>ζενίθιας</a:t>
+            </a:r>
+            <a:r>
+              <a:rPr lang="el-GR" dirty="0"/>
+              <a:t> γωνίας και αγγίζουν το 100% στις 85 μοίρες και στα 300 </a:t>
+            </a:r>
+            <a:r>
+              <a:rPr lang="el-GR" dirty="0" err="1"/>
+              <a:t>nm</a:t>
+            </a:r>
+            <a:r>
+              <a:rPr lang="el-GR"/>
+              <a:t>. </a:t>
+            </a:r>
+            <a:endParaRPr lang="en-US" dirty="0"/>
+          </a:p>
+        </p:txBody>
+      </p:sp>
+    </p:spTree>
+    <p:extLst>
+      <p:ext uri="{BB962C8B-B14F-4D97-AF65-F5344CB8AC3E}">
+        <p14:creationId xmlns:p14="http://schemas.microsoft.com/office/powerpoint/2010/main" val="2100127711"/>
       </p:ext>
     </p:extLst>
   </p:cSld>

</xml_diff>